<commit_message>
Ajustes dos arquivos de apresentação
</commit_message>
<xml_diff>
--- a/.notes/Frameworks de Desenvolvimento - Angular.pptx
+++ b/.notes/Frameworks de Desenvolvimento - Angular.pptx
@@ -28,15 +28,15 @@
   <p:notesSz cx="6858000" cy="9144000"/>
   <p:embeddedFontLst>
     <p:embeddedFont>
-      <p:font typeface="Nixie One" panose="020B0604020202020204" charset="0"/>
+      <p:font typeface="Helvetica Neue" panose="020B0604020202020204" charset="0"/>
       <p:regular r:id="rId18"/>
+      <p:bold r:id="rId19"/>
+      <p:italic r:id="rId20"/>
+      <p:boldItalic r:id="rId21"/>
     </p:embeddedFont>
     <p:embeddedFont>
-      <p:font typeface="Helvetica Neue" panose="020B0604020202020204" charset="0"/>
-      <p:regular r:id="rId19"/>
-      <p:bold r:id="rId20"/>
-      <p:italic r:id="rId21"/>
-      <p:boldItalic r:id="rId22"/>
+      <p:font typeface="Nixie One" panose="020B0604020202020204" charset="0"/>
+      <p:regular r:id="rId22"/>
     </p:embeddedFont>
   </p:embeddedFontLst>
   <p:defaultTextStyle>
@@ -28790,8 +28790,8 @@
         </p:nvSpPr>
         <p:spPr>
           <a:xfrm>
-            <a:off x="1350818" y="1203263"/>
-            <a:ext cx="6283038" cy="3819009"/>
+            <a:off x="1350818" y="959683"/>
+            <a:ext cx="6283038" cy="4062590"/>
           </a:xfrm>
           <a:prstGeom prst="rect">
             <a:avLst/>
@@ -28807,7 +28807,7 @@
               <a:buNone/>
             </a:pPr>
             <a:r>
-              <a:rPr lang="pt-BR" b="1" u="sng" dirty="0">
+              <a:rPr lang="pt-BR" sz="1600" b="1" u="sng" dirty="0">
                 <a:latin typeface="Nixie One" panose="020B0604020202020204" charset="0"/>
               </a:rPr>
               <a:t>1) Estruturas Básicas</a:t>
@@ -28819,43 +28819,43 @@
               <a:buChar char="Ø"/>
             </a:pPr>
             <a:r>
-              <a:rPr lang="pt-BR" dirty="0">
+              <a:rPr lang="pt-BR" sz="1600" dirty="0">
                 <a:latin typeface="Nixie One" panose="020B0604020202020204" charset="0"/>
               </a:rPr>
               <a:t>Classe : </a:t>
             </a:r>
             <a:r>
-              <a:rPr lang="pt-BR" dirty="0" err="1">
+              <a:rPr lang="pt-BR" sz="1600" dirty="0" err="1">
                 <a:latin typeface="Nixie One" panose="020B0604020202020204" charset="0"/>
               </a:rPr>
               <a:t>ng</a:t>
             </a:r>
             <a:r>
-              <a:rPr lang="pt-BR" dirty="0">
+              <a:rPr lang="pt-BR" sz="1600" dirty="0">
                 <a:latin typeface="Nixie One" panose="020B0604020202020204" charset="0"/>
               </a:rPr>
               <a:t> g </a:t>
             </a:r>
             <a:r>
-              <a:rPr lang="pt-BR" dirty="0" err="1">
+              <a:rPr lang="pt-BR" sz="1600" dirty="0" err="1">
                 <a:latin typeface="Nixie One" panose="020B0604020202020204" charset="0"/>
               </a:rPr>
               <a:t>class</a:t>
             </a:r>
             <a:r>
-              <a:rPr lang="pt-BR" dirty="0">
+              <a:rPr lang="pt-BR" sz="1600" dirty="0">
                 <a:latin typeface="Nixie One" panose="020B0604020202020204" charset="0"/>
               </a:rPr>
               <a:t> &lt;</a:t>
             </a:r>
             <a:r>
-              <a:rPr lang="pt-BR" dirty="0" err="1">
+              <a:rPr lang="pt-BR" sz="1600" dirty="0" err="1">
                 <a:latin typeface="Nixie One" panose="020B0604020202020204" charset="0"/>
               </a:rPr>
               <a:t>nameClass</a:t>
             </a:r>
             <a:r>
-              <a:rPr lang="pt-BR" dirty="0">
+              <a:rPr lang="pt-BR" sz="1600" dirty="0">
                 <a:latin typeface="Nixie One" panose="020B0604020202020204" charset="0"/>
               </a:rPr>
               <a:t>&gt;</a:t>
@@ -28867,49 +28867,49 @@
               <a:buChar char="Ø"/>
             </a:pPr>
             <a:r>
-              <a:rPr lang="pt-BR" dirty="0" err="1">
+              <a:rPr lang="pt-BR" sz="1600" dirty="0" err="1">
                 <a:latin typeface="Nixie One" panose="020B0604020202020204" charset="0"/>
               </a:rPr>
               <a:t>Enum</a:t>
             </a:r>
             <a:r>
-              <a:rPr lang="pt-BR" dirty="0">
+              <a:rPr lang="pt-BR" sz="1600" dirty="0">
                 <a:latin typeface="Nixie One" panose="020B0604020202020204" charset="0"/>
               </a:rPr>
               <a:t> : </a:t>
             </a:r>
             <a:r>
-              <a:rPr lang="pt-BR" dirty="0" err="1">
+              <a:rPr lang="pt-BR" sz="1600" dirty="0" err="1">
                 <a:latin typeface="Nixie One" panose="020B0604020202020204" charset="0"/>
               </a:rPr>
               <a:t>ng</a:t>
             </a:r>
             <a:r>
-              <a:rPr lang="pt-BR" dirty="0">
+              <a:rPr lang="pt-BR" sz="1600" dirty="0">
                 <a:latin typeface="Nixie One" panose="020B0604020202020204" charset="0"/>
               </a:rPr>
               <a:t> g </a:t>
             </a:r>
             <a:r>
-              <a:rPr lang="pt-BR" dirty="0" err="1">
+              <a:rPr lang="pt-BR" sz="1600" dirty="0" err="1">
                 <a:latin typeface="Nixie One" panose="020B0604020202020204" charset="0"/>
               </a:rPr>
               <a:t>enum</a:t>
             </a:r>
             <a:r>
-              <a:rPr lang="pt-BR" dirty="0">
+              <a:rPr lang="pt-BR" sz="1600" dirty="0">
                 <a:latin typeface="Nixie One" panose="020B0604020202020204" charset="0"/>
               </a:rPr>
               <a:t> &lt;</a:t>
             </a:r>
             <a:r>
-              <a:rPr lang="pt-BR" dirty="0" err="1">
+              <a:rPr lang="pt-BR" sz="1600" dirty="0" err="1">
                 <a:latin typeface="Nixie One" panose="020B0604020202020204" charset="0"/>
               </a:rPr>
               <a:t>nameEnum</a:t>
             </a:r>
             <a:r>
-              <a:rPr lang="pt-BR" dirty="0">
+              <a:rPr lang="pt-BR" sz="1600" dirty="0">
                 <a:latin typeface="Nixie One" panose="020B0604020202020204" charset="0"/>
               </a:rPr>
               <a:t>&gt;</a:t>
@@ -28921,31 +28921,31 @@
               <a:buChar char="Ø"/>
             </a:pPr>
             <a:r>
-              <a:rPr lang="pt-BR" dirty="0">
+              <a:rPr lang="pt-BR" sz="1600" dirty="0">
                 <a:latin typeface="Nixie One" panose="020B0604020202020204" charset="0"/>
               </a:rPr>
               <a:t>Interface : </a:t>
             </a:r>
             <a:r>
-              <a:rPr lang="pt-BR" dirty="0" err="1">
+              <a:rPr lang="pt-BR" sz="1600" dirty="0" err="1">
                 <a:latin typeface="Nixie One" panose="020B0604020202020204" charset="0"/>
               </a:rPr>
               <a:t>ng</a:t>
             </a:r>
             <a:r>
-              <a:rPr lang="pt-BR" dirty="0">
+              <a:rPr lang="pt-BR" sz="1600" dirty="0">
                 <a:latin typeface="Nixie One" panose="020B0604020202020204" charset="0"/>
               </a:rPr>
               <a:t> g interface &lt;</a:t>
             </a:r>
             <a:r>
-              <a:rPr lang="pt-BR" dirty="0" err="1">
+              <a:rPr lang="pt-BR" sz="1600" dirty="0" err="1">
                 <a:latin typeface="Nixie One" panose="020B0604020202020204" charset="0"/>
               </a:rPr>
               <a:t>nameInterf</a:t>
             </a:r>
             <a:r>
-              <a:rPr lang="pt-BR" dirty="0">
+              <a:rPr lang="pt-BR" sz="1600" dirty="0">
                 <a:latin typeface="Nixie One" panose="020B0604020202020204" charset="0"/>
               </a:rPr>
               <a:t>&gt;</a:t>
@@ -28956,7 +28956,7 @@
               <a:buFont typeface="Wingdings" panose="05000000000000000000" pitchFamily="2" charset="2"/>
               <a:buChar char="Ø"/>
             </a:pPr>
-            <a:endParaRPr lang="pt-BR" dirty="0">
+            <a:endParaRPr lang="pt-BR" sz="1600" dirty="0">
               <a:latin typeface="Nixie One" panose="020B0604020202020204" charset="0"/>
             </a:endParaRPr>
           </a:p>
@@ -28965,25 +28965,25 @@
               <a:buNone/>
             </a:pPr>
             <a:r>
-              <a:rPr lang="pt-BR" b="1" u="sng" dirty="0">
+              <a:rPr lang="pt-BR" sz="1600" b="1" u="sng" dirty="0">
                 <a:latin typeface="Nixie One" panose="020B0604020202020204" charset="0"/>
               </a:rPr>
               <a:t>2) Componente</a:t>
             </a:r>
             <a:r>
-              <a:rPr lang="pt-BR" dirty="0">
+              <a:rPr lang="pt-BR" sz="1600" dirty="0">
                 <a:latin typeface="Nixie One" panose="020B0604020202020204" charset="0"/>
               </a:rPr>
               <a:t>: Estrutura HTML, CSS e JS que realiza telas ou </a:t>
             </a:r>
             <a:r>
-              <a:rPr lang="pt-BR" dirty="0" err="1">
+              <a:rPr lang="pt-BR" sz="1600" dirty="0" err="1">
                 <a:latin typeface="Nixie One" panose="020B0604020202020204" charset="0"/>
               </a:rPr>
               <a:t>componentização</a:t>
             </a:r>
             <a:r>
-              <a:rPr lang="pt-BR" dirty="0">
+              <a:rPr lang="pt-BR" sz="1600" dirty="0">
                 <a:latin typeface="Nixie One" panose="020B0604020202020204" charset="0"/>
               </a:rPr>
               <a:t>.</a:t>
@@ -28994,25 +28994,25 @@
               <a:buNone/>
             </a:pPr>
             <a:r>
-              <a:rPr lang="pt-BR" dirty="0" err="1">
+              <a:rPr lang="pt-BR" sz="1600" dirty="0" err="1">
                 <a:latin typeface="Nixie One" panose="020B0604020202020204" charset="0"/>
               </a:rPr>
               <a:t>ng</a:t>
             </a:r>
             <a:r>
-              <a:rPr lang="pt-BR" dirty="0">
+              <a:rPr lang="pt-BR" sz="1600" dirty="0">
                 <a:latin typeface="Nixie One" panose="020B0604020202020204" charset="0"/>
               </a:rPr>
               <a:t> g c &lt;</a:t>
             </a:r>
             <a:r>
-              <a:rPr lang="pt-BR" dirty="0" err="1">
+              <a:rPr lang="pt-BR" sz="1600" dirty="0" err="1">
                 <a:latin typeface="Nixie One" panose="020B0604020202020204" charset="0"/>
               </a:rPr>
               <a:t>nameComponent</a:t>
             </a:r>
             <a:r>
-              <a:rPr lang="pt-BR" dirty="0">
+              <a:rPr lang="pt-BR" sz="1600" dirty="0">
                 <a:latin typeface="Nixie One" panose="020B0604020202020204" charset="0"/>
               </a:rPr>
               <a:t>&gt;</a:t>
@@ -29022,7 +29022,7 @@
             <a:pPr marL="139700" indent="0">
               <a:buNone/>
             </a:pPr>
-            <a:endParaRPr lang="pt-BR" dirty="0">
+            <a:endParaRPr lang="pt-BR" sz="1600" dirty="0">
               <a:latin typeface="Nixie One" panose="020B0604020202020204" charset="0"/>
             </a:endParaRPr>
           </a:p>
@@ -29031,37 +29031,37 @@
               <a:buNone/>
             </a:pPr>
             <a:r>
-              <a:rPr lang="pt-BR" b="1" u="sng" dirty="0">
+              <a:rPr lang="pt-BR" sz="1600" b="1" u="sng" dirty="0">
                 <a:latin typeface="Nixie One" panose="020B0604020202020204" charset="0"/>
               </a:rPr>
               <a:t>3) Module</a:t>
             </a:r>
             <a:r>
-              <a:rPr lang="pt-BR" dirty="0">
+              <a:rPr lang="pt-BR" sz="1600" dirty="0">
                 <a:latin typeface="Nixie One" panose="020B0604020202020204" charset="0"/>
               </a:rPr>
               <a:t>: Classe responsável por gerenciar </a:t>
             </a:r>
             <a:r>
-              <a:rPr lang="pt-BR" dirty="0" err="1">
+              <a:rPr lang="pt-BR" sz="1600" dirty="0" err="1">
                 <a:latin typeface="Nixie One" panose="020B0604020202020204" charset="0"/>
               </a:rPr>
               <a:t>imports</a:t>
             </a:r>
             <a:r>
-              <a:rPr lang="pt-BR" dirty="0">
+              <a:rPr lang="pt-BR" sz="1600" dirty="0">
                 <a:latin typeface="Nixie One" panose="020B0604020202020204" charset="0"/>
               </a:rPr>
               <a:t>, </a:t>
             </a:r>
             <a:r>
-              <a:rPr lang="pt-BR" dirty="0" err="1">
+              <a:rPr lang="pt-BR" sz="1600" dirty="0" err="1">
                 <a:latin typeface="Nixie One" panose="020B0604020202020204" charset="0"/>
               </a:rPr>
               <a:t>exports</a:t>
             </a:r>
             <a:r>
-              <a:rPr lang="pt-BR" dirty="0">
+              <a:rPr lang="pt-BR" sz="1600" dirty="0">
                 <a:latin typeface="Nixie One" panose="020B0604020202020204" charset="0"/>
               </a:rPr>
               <a:t> para componentes declarados em seu contexto.</a:t>
@@ -29072,25 +29072,25 @@
               <a:buNone/>
             </a:pPr>
             <a:r>
-              <a:rPr lang="pt-BR" dirty="0" err="1">
+              <a:rPr lang="pt-BR" sz="1600" dirty="0" err="1">
                 <a:latin typeface="Nixie One" panose="020B0604020202020204" charset="0"/>
               </a:rPr>
               <a:t>ng</a:t>
             </a:r>
             <a:r>
-              <a:rPr lang="pt-BR" dirty="0">
+              <a:rPr lang="pt-BR" sz="1600" dirty="0">
                 <a:latin typeface="Nixie One" panose="020B0604020202020204" charset="0"/>
               </a:rPr>
               <a:t> g m &lt;</a:t>
             </a:r>
             <a:r>
-              <a:rPr lang="pt-BR" dirty="0" err="1">
+              <a:rPr lang="pt-BR" sz="1600" dirty="0" err="1">
                 <a:latin typeface="Nixie One" panose="020B0604020202020204" charset="0"/>
               </a:rPr>
               <a:t>nameModule</a:t>
             </a:r>
             <a:r>
-              <a:rPr lang="pt-BR" dirty="0">
+              <a:rPr lang="pt-BR" sz="1600" dirty="0">
                 <a:latin typeface="Nixie One" panose="020B0604020202020204" charset="0"/>
               </a:rPr>
               <a:t>&gt;</a:t>
@@ -29232,7 +29232,7 @@
         </p:nvSpPr>
         <p:spPr>
           <a:xfrm>
-            <a:off x="1350818" y="1203263"/>
+            <a:off x="1315792" y="966516"/>
             <a:ext cx="6283038" cy="3819009"/>
           </a:xfrm>
           <a:prstGeom prst="rect">
@@ -29249,13 +29249,13 @@
               <a:buNone/>
             </a:pPr>
             <a:r>
-              <a:rPr lang="pt-BR" b="1" u="sng" dirty="0">
+              <a:rPr lang="pt-BR" sz="1600" b="1" u="sng" dirty="0">
                 <a:latin typeface="Nixie One" panose="020B0604020202020204" charset="0"/>
               </a:rPr>
               <a:t>4) Service</a:t>
             </a:r>
             <a:r>
-              <a:rPr lang="pt-BR" dirty="0">
+              <a:rPr lang="pt-BR" sz="1600" dirty="0">
                 <a:latin typeface="Nixie One" panose="020B0604020202020204" charset="0"/>
               </a:rPr>
               <a:t>: Classe Responsável por realizar a injeção de dependência.</a:t>
@@ -29266,25 +29266,25 @@
               <a:buNone/>
             </a:pPr>
             <a:r>
-              <a:rPr lang="pt-BR" dirty="0" err="1">
+              <a:rPr lang="pt-BR" sz="1600" dirty="0" err="1">
                 <a:latin typeface="Nixie One" panose="020B0604020202020204" charset="0"/>
               </a:rPr>
               <a:t>ng</a:t>
             </a:r>
             <a:r>
-              <a:rPr lang="pt-BR" dirty="0">
+              <a:rPr lang="pt-BR" sz="1600" dirty="0">
                 <a:latin typeface="Nixie One" panose="020B0604020202020204" charset="0"/>
               </a:rPr>
               <a:t> g s &lt;</a:t>
             </a:r>
             <a:r>
-              <a:rPr lang="pt-BR" dirty="0" err="1">
+              <a:rPr lang="pt-BR" sz="1600" dirty="0" err="1">
                 <a:latin typeface="Nixie One" panose="020B0604020202020204" charset="0"/>
               </a:rPr>
               <a:t>nameService</a:t>
             </a:r>
             <a:r>
-              <a:rPr lang="pt-BR" dirty="0">
+              <a:rPr lang="pt-BR" sz="1600" dirty="0">
                 <a:latin typeface="Nixie One" panose="020B0604020202020204" charset="0"/>
               </a:rPr>
               <a:t>&gt;</a:t>
@@ -29294,7 +29294,7 @@
             <a:pPr marL="139700" indent="0" algn="ctr">
               <a:buNone/>
             </a:pPr>
-            <a:endParaRPr lang="pt-BR" dirty="0">
+            <a:endParaRPr lang="pt-BR" sz="1600" dirty="0">
               <a:latin typeface="Nixie One" panose="020B0604020202020204" charset="0"/>
             </a:endParaRPr>
           </a:p>
@@ -29303,19 +29303,19 @@
               <a:buNone/>
             </a:pPr>
             <a:r>
-              <a:rPr lang="pt-BR" b="1" u="sng" dirty="0">
+              <a:rPr lang="pt-BR" sz="1600" b="1" u="sng" dirty="0">
                 <a:latin typeface="Nixie One" panose="020B0604020202020204" charset="0"/>
               </a:rPr>
               <a:t>5) </a:t>
             </a:r>
             <a:r>
-              <a:rPr lang="pt-BR" b="1" u="sng" dirty="0" err="1">
+              <a:rPr lang="pt-BR" sz="1600" b="1" u="sng" dirty="0" err="1">
                 <a:latin typeface="Nixie One" panose="020B0604020202020204" charset="0"/>
               </a:rPr>
               <a:t>Pipe</a:t>
             </a:r>
             <a:r>
-              <a:rPr lang="pt-BR" dirty="0">
+              <a:rPr lang="pt-BR" sz="1600" dirty="0">
                 <a:latin typeface="Nixie One" panose="020B0604020202020204" charset="0"/>
               </a:rPr>
               <a:t>: Estrutura responsável por formatar dados.</a:t>
@@ -29326,25 +29326,25 @@
               <a:buNone/>
             </a:pPr>
             <a:r>
-              <a:rPr lang="pt-BR" dirty="0" err="1">
+              <a:rPr lang="pt-BR" sz="1600" dirty="0" err="1">
                 <a:latin typeface="Nixie One" panose="020B0604020202020204" charset="0"/>
               </a:rPr>
               <a:t>ng</a:t>
             </a:r>
             <a:r>
-              <a:rPr lang="pt-BR" dirty="0">
+              <a:rPr lang="pt-BR" sz="1600" dirty="0">
                 <a:latin typeface="Nixie One" panose="020B0604020202020204" charset="0"/>
               </a:rPr>
               <a:t> g p &lt;</a:t>
             </a:r>
             <a:r>
-              <a:rPr lang="pt-BR" dirty="0" err="1">
+              <a:rPr lang="pt-BR" sz="1600" dirty="0" err="1">
                 <a:latin typeface="Nixie One" panose="020B0604020202020204" charset="0"/>
               </a:rPr>
               <a:t>namePipe</a:t>
             </a:r>
             <a:r>
-              <a:rPr lang="pt-BR" dirty="0">
+              <a:rPr lang="pt-BR" sz="1600" dirty="0">
                 <a:latin typeface="Nixie One" panose="020B0604020202020204" charset="0"/>
               </a:rPr>
               <a:t>&gt;</a:t>
@@ -29354,7 +29354,7 @@
             <a:pPr marL="139700" indent="0" algn="ctr">
               <a:buNone/>
             </a:pPr>
-            <a:endParaRPr lang="pt-BR" dirty="0">
+            <a:endParaRPr lang="pt-BR" sz="1600" dirty="0">
               <a:latin typeface="Nixie One" panose="020B0604020202020204" charset="0"/>
             </a:endParaRPr>
           </a:p>
@@ -29363,31 +29363,31 @@
               <a:buNone/>
             </a:pPr>
             <a:r>
-              <a:rPr lang="pt-BR" b="1" u="sng" dirty="0">
+              <a:rPr lang="pt-BR" sz="1600" b="1" u="sng" dirty="0">
                 <a:latin typeface="Nixie One" panose="020B0604020202020204" charset="0"/>
               </a:rPr>
               <a:t>6) </a:t>
             </a:r>
             <a:r>
-              <a:rPr lang="pt-BR" b="1" u="sng" dirty="0" err="1">
+              <a:rPr lang="pt-BR" sz="1600" b="1" u="sng" dirty="0" err="1">
                 <a:latin typeface="Nixie One" panose="020B0604020202020204" charset="0"/>
               </a:rPr>
               <a:t>Directive</a:t>
             </a:r>
             <a:r>
-              <a:rPr lang="pt-BR" dirty="0">
+              <a:rPr lang="pt-BR" sz="1600" dirty="0">
                 <a:latin typeface="Nixie One" panose="020B0604020202020204" charset="0"/>
               </a:rPr>
               <a:t>: Estrutura lógica nas </a:t>
             </a:r>
             <a:r>
-              <a:rPr lang="pt-BR" dirty="0" err="1">
+              <a:rPr lang="pt-BR" sz="1600" dirty="0" err="1">
                 <a:latin typeface="Nixie One" panose="020B0604020202020204" charset="0"/>
               </a:rPr>
               <a:t>tags</a:t>
             </a:r>
             <a:r>
-              <a:rPr lang="pt-BR" dirty="0">
+              <a:rPr lang="pt-BR" sz="1600" dirty="0">
                 <a:latin typeface="Nixie One" panose="020B0604020202020204" charset="0"/>
               </a:rPr>
               <a:t> HTML.</a:t>
@@ -29398,25 +29398,25 @@
               <a:buNone/>
             </a:pPr>
             <a:r>
-              <a:rPr lang="pt-BR" dirty="0" err="1">
+              <a:rPr lang="pt-BR" sz="1600" dirty="0" err="1">
                 <a:latin typeface="Nixie One" panose="020B0604020202020204" charset="0"/>
               </a:rPr>
               <a:t>ng</a:t>
             </a:r>
             <a:r>
-              <a:rPr lang="pt-BR" dirty="0">
+              <a:rPr lang="pt-BR" sz="1600" dirty="0">
                 <a:latin typeface="Nixie One" panose="020B0604020202020204" charset="0"/>
               </a:rPr>
               <a:t> g d &lt;</a:t>
             </a:r>
             <a:r>
-              <a:rPr lang="pt-BR" dirty="0" err="1">
+              <a:rPr lang="pt-BR" sz="1600" dirty="0" err="1">
                 <a:latin typeface="Nixie One" panose="020B0604020202020204" charset="0"/>
               </a:rPr>
               <a:t>nameDirective</a:t>
             </a:r>
             <a:r>
-              <a:rPr lang="pt-BR" dirty="0">
+              <a:rPr lang="pt-BR" sz="1600" dirty="0">
                 <a:latin typeface="Nixie One" panose="020B0604020202020204" charset="0"/>
               </a:rPr>
               <a:t>&gt;</a:t>
@@ -29426,7 +29426,7 @@
             <a:pPr marL="139700" indent="0">
               <a:buNone/>
             </a:pPr>
-            <a:endParaRPr lang="pt-BR" dirty="0">
+            <a:endParaRPr lang="pt-BR" sz="1600" dirty="0">
               <a:latin typeface="Nixie One" panose="020B0604020202020204" charset="0"/>
             </a:endParaRPr>
           </a:p>
@@ -29435,13 +29435,13 @@
               <a:buNone/>
             </a:pPr>
             <a:r>
-              <a:rPr lang="pt-BR" b="1" u="sng" dirty="0">
+              <a:rPr lang="pt-BR" sz="1600" b="1" u="sng" dirty="0">
                 <a:latin typeface="Nixie One" panose="020B0604020202020204" charset="0"/>
               </a:rPr>
               <a:t>7) Guard</a:t>
             </a:r>
             <a:r>
-              <a:rPr lang="pt-BR" dirty="0">
+              <a:rPr lang="pt-BR" sz="1600" dirty="0">
                 <a:latin typeface="Nixie One" panose="020B0604020202020204" charset="0"/>
               </a:rPr>
               <a:t>: Classe responsável por criar regras de restrição nas rotas.</a:t>
@@ -29452,37 +29452,37 @@
               <a:buNone/>
             </a:pPr>
             <a:r>
-              <a:rPr lang="pt-BR" dirty="0" err="1">
+              <a:rPr lang="pt-BR" sz="1600" dirty="0" err="1">
                 <a:latin typeface="Nixie One" panose="020B0604020202020204" charset="0"/>
               </a:rPr>
               <a:t>ng</a:t>
             </a:r>
             <a:r>
-              <a:rPr lang="pt-BR" dirty="0">
+              <a:rPr lang="pt-BR" sz="1600" dirty="0">
                 <a:latin typeface="Nixie One" panose="020B0604020202020204" charset="0"/>
               </a:rPr>
               <a:t> g </a:t>
             </a:r>
             <a:r>
-              <a:rPr lang="pt-BR" dirty="0" err="1">
+              <a:rPr lang="pt-BR" sz="1600" dirty="0" err="1">
                 <a:latin typeface="Nixie One" panose="020B0604020202020204" charset="0"/>
               </a:rPr>
               <a:t>g</a:t>
             </a:r>
             <a:r>
-              <a:rPr lang="pt-BR" dirty="0">
+              <a:rPr lang="pt-BR" sz="1600" dirty="0">
                 <a:latin typeface="Nixie One" panose="020B0604020202020204" charset="0"/>
               </a:rPr>
               <a:t> &lt;</a:t>
             </a:r>
             <a:r>
-              <a:rPr lang="pt-BR" dirty="0" err="1">
+              <a:rPr lang="pt-BR" sz="1600" dirty="0" err="1">
                 <a:latin typeface="Nixie One" panose="020B0604020202020204" charset="0"/>
               </a:rPr>
               <a:t>nameGuard</a:t>
             </a:r>
             <a:r>
-              <a:rPr lang="pt-BR" dirty="0">
+              <a:rPr lang="pt-BR" sz="1600" dirty="0">
                 <a:latin typeface="Nixie One" panose="020B0604020202020204" charset="0"/>
               </a:rPr>
               <a:t>&gt;</a:t>
@@ -30558,7 +30558,7 @@
         </p:nvSpPr>
         <p:spPr>
           <a:xfrm>
-            <a:off x="1479932" y="1447045"/>
+            <a:off x="1479931" y="1223525"/>
             <a:ext cx="5707145" cy="3059200"/>
           </a:xfrm>
           <a:prstGeom prst="rect">
@@ -30576,13 +30576,97 @@
               <a:buChar char="Ø"/>
             </a:pPr>
             <a:r>
+              <a:rPr lang="pt-BR" sz="1600" b="1" dirty="0" smtClean="0">
+                <a:solidFill>
+                  <a:schemeClr val="tx1"/>
+                </a:solidFill>
+                <a:latin typeface="Nixie One" panose="020B0604020202020204" charset="0"/>
+              </a:rPr>
+              <a:t>NOLETO, </a:t>
+            </a:r>
+            <a:r>
+              <a:rPr lang="pt-BR" sz="1600" dirty="0" smtClean="0">
+                <a:solidFill>
+                  <a:schemeClr val="tx1"/>
+                </a:solidFill>
+                <a:latin typeface="Nixie One" panose="020B0604020202020204" charset="0"/>
+              </a:rPr>
+              <a:t>Cairo</a:t>
+            </a:r>
+            <a:r>
+              <a:rPr lang="pt-BR" sz="1600" dirty="0" smtClean="0">
+                <a:solidFill>
+                  <a:schemeClr val="tx1"/>
+                </a:solidFill>
+                <a:latin typeface="Nixie One" panose="020B0604020202020204" charset="0"/>
+              </a:rPr>
+              <a:t>. </a:t>
+            </a:r>
+            <a:r>
+              <a:rPr lang="pt-BR" sz="1600" dirty="0" err="1" smtClean="0">
+                <a:solidFill>
+                  <a:schemeClr val="tx1"/>
+                </a:solidFill>
+                <a:latin typeface="Nixie One" panose="020B0604020202020204" charset="0"/>
+              </a:rPr>
+              <a:t>Typescript</a:t>
+            </a:r>
+            <a:r>
               <a:rPr lang="pt-BR" sz="1600" dirty="0">
                 <a:solidFill>
                   <a:schemeClr val="tx1"/>
                 </a:solidFill>
                 <a:latin typeface="Nixie One" panose="020B0604020202020204" charset="0"/>
               </a:rPr>
-              <a:t>Disponível em: https://www.hostinger.com.br/tutoriais/o-que-e-angular. Acesso em: 02 de fevereiro de 2021;</a:t>
+              <a:t>: o que é, principais conceitos e porquê usar</a:t>
+            </a:r>
+            <a:r>
+              <a:rPr lang="pt-BR" sz="1600" dirty="0" smtClean="0">
+                <a:solidFill>
+                  <a:schemeClr val="tx1"/>
+                </a:solidFill>
+                <a:latin typeface="Nixie One" panose="020B0604020202020204" charset="0"/>
+              </a:rPr>
+              <a:t>! São Paulo - </a:t>
+            </a:r>
+            <a:r>
+              <a:rPr lang="pt-BR" sz="1600" dirty="0">
+                <a:latin typeface="Nixie One" panose="020B0604020202020204" charset="0"/>
+              </a:rPr>
+              <a:t>1 de maio de </a:t>
+            </a:r>
+            <a:r>
+              <a:rPr lang="pt-BR" sz="1600" dirty="0" smtClean="0">
+                <a:latin typeface="Nixie One" panose="020B0604020202020204" charset="0"/>
+              </a:rPr>
+              <a:t>2020</a:t>
+            </a:r>
+            <a:r>
+              <a:rPr lang="pt-BR" sz="1600" dirty="0" smtClean="0">
+                <a:solidFill>
+                  <a:schemeClr val="tx1"/>
+                </a:solidFill>
+                <a:latin typeface="Nixie One" panose="020B0604020202020204" charset="0"/>
+              </a:rPr>
+              <a:t>. Disponível em: https</a:t>
+            </a:r>
+            <a:r>
+              <a:rPr lang="pt-BR" sz="1600" dirty="0">
+                <a:solidFill>
+                  <a:schemeClr val="tx1"/>
+                </a:solidFill>
+                <a:latin typeface="Nixie One" panose="020B0604020202020204" charset="0"/>
+              </a:rPr>
+              <a:t>://blog.betrybe.com/desenvolvimento-web/typescript/. </a:t>
+            </a:r>
+            <a:r>
+              <a:rPr lang="pt-BR" sz="1600" dirty="0" smtClean="0">
+                <a:solidFill>
+                  <a:schemeClr val="tx1"/>
+                </a:solidFill>
+                <a:latin typeface="Nixie One" panose="020B0604020202020204" charset="0"/>
+              </a:rPr>
+              <a:t>Acesso em: 02 de fevereiro de 2021;</a:t>
             </a:r>
           </a:p>
           <a:p>
@@ -30590,6 +30674,27 @@
               <a:buFont typeface="Wingdings" panose="05000000000000000000" pitchFamily="2" charset="2"/>
               <a:buChar char="Ø"/>
             </a:pPr>
+            <a:endParaRPr lang="pt-BR" sz="1600" dirty="0" smtClean="0">
+              <a:solidFill>
+                <a:schemeClr val="tx1"/>
+              </a:solidFill>
+              <a:latin typeface="Nixie One" panose="020B0604020202020204" charset="0"/>
+            </a:endParaRPr>
+          </a:p>
+          <a:p>
+            <a:pPr algn="just">
+              <a:buFont typeface="Wingdings" panose="05000000000000000000" pitchFamily="2" charset="2"/>
+              <a:buChar char="Ø"/>
+            </a:pPr>
+            <a:r>
+              <a:rPr lang="pt-BR" sz="1600" dirty="0" smtClean="0">
+                <a:solidFill>
+                  <a:schemeClr val="tx1"/>
+                </a:solidFill>
+                <a:latin typeface="Nixie One" panose="020B0604020202020204" charset="0"/>
+              </a:rPr>
+              <a:t>Disponível </a:t>
+            </a:r>
             <a:r>
               <a:rPr lang="pt-BR" sz="1600" dirty="0">
                 <a:solidFill>
@@ -30597,22 +30702,16 @@
                 </a:solidFill>
                 <a:latin typeface="Nixie One" panose="020B0604020202020204" charset="0"/>
               </a:rPr>
-              <a:t>Disponível em: https://bognarjunior.wordpress.com/2016/02/28/angularjs-spa-single-page-application/. Acesso em: 02 de fevereiro de 2021;</a:t>
+              <a:t>em: https://bognarjunior.wordpress.com/2016/02/28/angularjs-spa-single-page-application/. Acesso em: 02 de fevereiro de 2021</a:t>
             </a:r>
-          </a:p>
-          <a:p>
-            <a:pPr algn="just">
-              <a:buFont typeface="Wingdings" panose="05000000000000000000" pitchFamily="2" charset="2"/>
-              <a:buChar char="Ø"/>
-            </a:pPr>
             <a:r>
-              <a:rPr lang="pt-BR" sz="1600" dirty="0">
+              <a:rPr lang="pt-BR" sz="1600" dirty="0" smtClean="0">
                 <a:solidFill>
                   <a:schemeClr val="tx1"/>
                 </a:solidFill>
                 <a:latin typeface="Nixie One" panose="020B0604020202020204" charset="0"/>
               </a:rPr>
-              <a:t>Disponível em: https://blog.betrybe.com/desenvolvimento-web/typescript/. Acesso em 02 de fevereiro de 2021.</a:t>
+              <a:t>;</a:t>
             </a:r>
           </a:p>
           <a:p>
@@ -30644,7 +30743,7 @@
         </p:nvSpPr>
         <p:spPr>
           <a:xfrm>
-            <a:off x="1861354" y="554500"/>
+            <a:off x="1861354" y="371620"/>
             <a:ext cx="4944300" cy="645300"/>
           </a:xfrm>
           <a:prstGeom prst="rect">
@@ -30776,13 +30875,52 @@
               <a:buChar char="Ø"/>
             </a:pPr>
             <a:r>
+              <a:rPr lang="pt-BR" sz="1600" b="1" dirty="0" smtClean="0">
+                <a:solidFill>
+                  <a:schemeClr val="tx1"/>
+                </a:solidFill>
+                <a:latin typeface="Nixie One" panose="020B0604020202020204" charset="0"/>
+              </a:rPr>
+              <a:t>L</a:t>
+            </a:r>
+            <a:r>
+              <a:rPr lang="pt-BR" sz="1600" dirty="0" smtClean="0">
+                <a:solidFill>
+                  <a:schemeClr val="tx1"/>
+                </a:solidFill>
+                <a:latin typeface="Nixie One" panose="020B0604020202020204" charset="0"/>
+              </a:rPr>
+              <a:t>, </a:t>
+            </a:r>
+            <a:r>
+              <a:rPr lang="pt-BR" sz="1600" dirty="0" smtClean="0">
+                <a:latin typeface="Nixie One" panose="020B0604020202020204" charset="0"/>
+              </a:rPr>
+              <a:t>Andrei</a:t>
+            </a:r>
+            <a:r>
+              <a:rPr lang="pt-BR" sz="1600" dirty="0">
+                <a:latin typeface="Nixie One" panose="020B0604020202020204" charset="0"/>
+              </a:rPr>
+              <a:t>. O Que é Angular? Guia para Iniciantes São Paulo – 13 de janeiro de 2020 </a:t>
+            </a:r>
+            <a:r>
               <a:rPr lang="pt-BR" sz="1600" dirty="0">
                 <a:solidFill>
                   <a:schemeClr val="tx1"/>
                 </a:solidFill>
                 <a:latin typeface="Nixie One" panose="020B0604020202020204" charset="0"/>
               </a:rPr>
-              <a:t>Disponível em: https://medium.com/@henrique.freire/react-vue-angular-conhe%C3%A7a-suas-vantagens-e-desvantagens-e-qual-%C3%A9-melhor-para-seus-projetos-53734bb3d37f. Acesso em: 02 de fevereiro de 2021.</a:t>
+              <a:t>Disponível em: https://www.hostinger.com.br/tutoriais/o-que-e-angular. Acesso em: 02 de fevereiro de </a:t>
+            </a:r>
+            <a:r>
+              <a:rPr lang="pt-BR" sz="1600" dirty="0" smtClean="0">
+                <a:solidFill>
+                  <a:schemeClr val="tx1"/>
+                </a:solidFill>
+                <a:latin typeface="Nixie One" panose="020B0604020202020204" charset="0"/>
+              </a:rPr>
+              <a:t>2021;</a:t>
             </a:r>
           </a:p>
           <a:p>
@@ -30790,6 +30928,57 @@
               <a:buFont typeface="Wingdings" panose="05000000000000000000" pitchFamily="2" charset="2"/>
               <a:buChar char="Ø"/>
             </a:pPr>
+            <a:endParaRPr lang="pt-BR" sz="1600" b="1" dirty="0" smtClean="0">
+              <a:solidFill>
+                <a:schemeClr val="tx1"/>
+              </a:solidFill>
+              <a:latin typeface="Nixie One" panose="020B0604020202020204" charset="0"/>
+            </a:endParaRPr>
+          </a:p>
+          <a:p>
+            <a:pPr algn="just">
+              <a:buFont typeface="Wingdings" panose="05000000000000000000" pitchFamily="2" charset="2"/>
+              <a:buChar char="Ø"/>
+            </a:pPr>
+            <a:r>
+              <a:rPr lang="pt-BR" sz="1600" b="1" smtClean="0">
+                <a:solidFill>
+                  <a:schemeClr val="tx1"/>
+                </a:solidFill>
+                <a:latin typeface="Nixie One" panose="020B0604020202020204" charset="0"/>
+              </a:rPr>
+              <a:t>LISBOA, </a:t>
+            </a:r>
+            <a:r>
+              <a:rPr lang="pt-BR" sz="1600" dirty="0" smtClean="0">
+                <a:solidFill>
+                  <a:schemeClr val="tx1"/>
+                </a:solidFill>
+                <a:latin typeface="Nixie One" panose="020B0604020202020204" charset="0"/>
+              </a:rPr>
+              <a:t>Maria. </a:t>
+            </a:r>
+            <a:r>
+              <a:rPr lang="pt-BR" sz="1600" dirty="0">
+                <a:latin typeface="Nixie One" panose="020B0604020202020204" charset="0"/>
+              </a:rPr>
+              <a:t>Criando um projeto </a:t>
+            </a:r>
+            <a:r>
+              <a:rPr lang="pt-BR" sz="1600" dirty="0" smtClean="0">
+                <a:latin typeface="Nixie One" panose="020B0604020202020204" charset="0"/>
+              </a:rPr>
+              <a:t>Angular. São Paulo – 20 de Maio de 2020. </a:t>
+            </a:r>
+            <a:r>
+              <a:rPr lang="pt-BR" sz="1600" dirty="0" smtClean="0">
+                <a:solidFill>
+                  <a:schemeClr val="tx1"/>
+                </a:solidFill>
+                <a:latin typeface="Nixie One" panose="020B0604020202020204" charset="0"/>
+              </a:rPr>
+              <a:t>Disponível </a:t>
+            </a:r>
             <a:r>
               <a:rPr lang="pt-BR" sz="1600" dirty="0">
                 <a:solidFill>
@@ -30797,8 +30986,23 @@
                 </a:solidFill>
                 <a:latin typeface="Nixie One" panose="020B0604020202020204" charset="0"/>
               </a:rPr>
-              <a:t>Disponível em: https://marialisboa.com/criando-um-projeto-angular/. Acesso em 02 de fevereiro de 2021.</a:t>
+              <a:t>em: https://marialisboa.com/criando-um-projeto-angular/. Acesso em 02 de fevereiro de 2021</a:t>
             </a:r>
+            <a:r>
+              <a:rPr lang="pt-BR" sz="1600" dirty="0" smtClean="0">
+                <a:solidFill>
+                  <a:schemeClr val="tx1"/>
+                </a:solidFill>
+                <a:latin typeface="Nixie One" panose="020B0604020202020204" charset="0"/>
+              </a:rPr>
+              <a:t>.</a:t>
+            </a:r>
+            <a:endParaRPr lang="pt-BR" sz="1600" dirty="0">
+              <a:solidFill>
+                <a:schemeClr val="tx1"/>
+              </a:solidFill>
+              <a:latin typeface="Nixie One" panose="020B0604020202020204" charset="0"/>
+            </a:endParaRPr>
           </a:p>
           <a:p>
             <a:pPr marL="285750" lvl="0" indent="-285750" algn="l" rtl="0">
@@ -31198,7 +31402,17 @@
                 <a:latin typeface="Nixie One" panose="020B0604020202020204" charset="0"/>
                 <a:cs typeface="Arial" panose="020B0604020202020204" pitchFamily="34" charset="0"/>
               </a:rPr>
-              <a:t>Criação do projeto Angular;</a:t>
+              <a:t>Criação do projeto Angular</a:t>
+            </a:r>
+            <a:r>
+              <a:rPr lang="pt-BR" sz="1600" dirty="0" smtClean="0">
+                <a:solidFill>
+                  <a:schemeClr val="tx1"/>
+                </a:solidFill>
+                <a:latin typeface="Nixie One" panose="020B0604020202020204" charset="0"/>
+                <a:cs typeface="Arial" panose="020B0604020202020204" pitchFamily="34" charset="0"/>
+              </a:rPr>
+              <a:t>;</a:t>
             </a:r>
           </a:p>
           <a:p>
@@ -31213,6 +31427,16 @@
               <a:buChar char="Ø"/>
             </a:pPr>
             <a:r>
+              <a:rPr lang="pt-BR" sz="1600" dirty="0" smtClean="0">
+                <a:solidFill>
+                  <a:schemeClr val="tx1"/>
+                </a:solidFill>
+                <a:latin typeface="Nixie One" panose="020B0604020202020204" charset="0"/>
+                <a:cs typeface="Arial" panose="020B0604020202020204" pitchFamily="34" charset="0"/>
+              </a:rPr>
+              <a:t>Referências</a:t>
+            </a:r>
+            <a:r>
               <a:rPr lang="pt-BR" sz="1600" dirty="0">
                 <a:solidFill>
                   <a:schemeClr val="tx1"/>
@@ -31220,7 +31444,7 @@
                 <a:latin typeface="Nixie One" panose="020B0604020202020204" charset="0"/>
                 <a:cs typeface="Arial" panose="020B0604020202020204" pitchFamily="34" charset="0"/>
               </a:rPr>
-              <a:t>Referências.</a:t>
+              <a:t>.</a:t>
             </a:r>
           </a:p>
         </p:txBody>
@@ -31574,40 +31798,31 @@
             </a:r>
           </a:p>
           <a:p>
-            <a:pPr algn="just">
+            <a:pPr>
               <a:buFont typeface="Wingdings" panose="05000000000000000000" pitchFamily="2" charset="2"/>
               <a:buChar char="Ø"/>
             </a:pPr>
             <a:r>
-              <a:rPr lang="pt-BR" sz="1600" dirty="0">
+              <a:rPr lang="pt-BR" sz="1600" dirty="0" smtClean="0">
                 <a:latin typeface="Nixie One" panose="020B0604020202020204" charset="0"/>
               </a:rPr>
-              <a:t>Desenvolvimento de aplicações Web;</a:t>
+              <a:t>Desenvolvimento de </a:t>
             </a:r>
-          </a:p>
-          <a:p>
-            <a:pPr algn="just">
-              <a:buFont typeface="Wingdings" panose="05000000000000000000" pitchFamily="2" charset="2"/>
-              <a:buChar char="Ø"/>
-            </a:pPr>
             <a:r>
               <a:rPr lang="pt-BR" sz="1600" dirty="0">
                 <a:latin typeface="Nixie One" panose="020B0604020202020204" charset="0"/>
               </a:rPr>
-              <a:t>Otimizar a experiência do usuário;</a:t>
+              <a:t>aplicações </a:t>
             </a:r>
-          </a:p>
-          <a:p>
-            <a:pPr algn="just">
-              <a:buFont typeface="Wingdings" panose="05000000000000000000" pitchFamily="2" charset="2"/>
-              <a:buChar char="Ø"/>
-            </a:pPr>
             <a:r>
-              <a:rPr lang="pt-BR" sz="1600" dirty="0">
+              <a:rPr lang="pt-BR" sz="1600" dirty="0" smtClean="0">
                 <a:latin typeface="Nixie One" panose="020B0604020202020204" charset="0"/>
               </a:rPr>
-              <a:t>Não renderiza a página toda, apenas partes dela.</a:t>
+              <a:t>Web.</a:t>
             </a:r>
+            <a:endParaRPr lang="pt-BR" sz="1600" dirty="0">
+              <a:latin typeface="Nixie One" panose="020B0604020202020204" charset="0"/>
+            </a:endParaRPr>
           </a:p>
         </p:txBody>
       </p:sp>
@@ -32306,88 +32521,10 @@
               <a:t>backend</a:t>
             </a:r>
             <a:r>
-              <a:rPr lang="pt-BR" sz="1600" dirty="0">
+              <a:rPr lang="pt-BR" sz="1600" dirty="0" smtClean="0">
                 <a:latin typeface="Nixie One" panose="020B0604020202020204" charset="0"/>
               </a:rPr>
               <a:t>);</a:t>
-            </a:r>
-          </a:p>
-          <a:p>
-            <a:pPr marL="285750" lvl="0" indent="-285750" algn="l" rtl="0">
-              <a:spcBef>
-                <a:spcPts val="600"/>
-              </a:spcBef>
-              <a:spcAft>
-                <a:spcPts val="0"/>
-              </a:spcAft>
-              <a:buFont typeface="Wingdings" panose="05000000000000000000" pitchFamily="2" charset="2"/>
-              <a:buChar char="Ø"/>
-            </a:pPr>
-            <a:r>
-              <a:rPr lang="pt-BR" sz="1600" dirty="0">
-                <a:latin typeface="Nixie One" panose="020B0604020202020204" charset="0"/>
-              </a:rPr>
-              <a:t>Estrutura do código;</a:t>
-            </a:r>
-          </a:p>
-          <a:p>
-            <a:pPr marL="285750" lvl="0" indent="-285750" algn="l" rtl="0">
-              <a:spcBef>
-                <a:spcPts val="600"/>
-              </a:spcBef>
-              <a:spcAft>
-                <a:spcPts val="0"/>
-              </a:spcAft>
-              <a:buFont typeface="Wingdings" panose="05000000000000000000" pitchFamily="2" charset="2"/>
-              <a:buChar char="Ø"/>
-            </a:pPr>
-            <a:r>
-              <a:rPr lang="pt-BR" sz="1600" dirty="0">
-                <a:latin typeface="Nixie One" panose="020B0604020202020204" charset="0"/>
-              </a:rPr>
-              <a:t>Ambientes de testes;</a:t>
-            </a:r>
-          </a:p>
-          <a:p>
-            <a:pPr marL="285750" lvl="0" indent="-285750" algn="l" rtl="0">
-              <a:spcBef>
-                <a:spcPts val="600"/>
-              </a:spcBef>
-              <a:spcAft>
-                <a:spcPts val="0"/>
-              </a:spcAft>
-              <a:buFont typeface="Wingdings" panose="05000000000000000000" pitchFamily="2" charset="2"/>
-              <a:buChar char="Ø"/>
-            </a:pPr>
-            <a:r>
-              <a:rPr lang="pt-BR" sz="1600" dirty="0">
-                <a:latin typeface="Nixie One" panose="020B0604020202020204" charset="0"/>
-              </a:rPr>
-              <a:t>Separação </a:t>
-            </a:r>
-            <a:r>
-              <a:rPr lang="pt-BR" sz="1600" dirty="0" err="1">
-                <a:latin typeface="Nixie One" panose="020B0604020202020204" charset="0"/>
-              </a:rPr>
-              <a:t>backend</a:t>
-            </a:r>
-            <a:r>
-              <a:rPr lang="pt-BR" sz="1600" dirty="0">
-                <a:latin typeface="Nixie One" panose="020B0604020202020204" charset="0"/>
-              </a:rPr>
-              <a:t> e </a:t>
-            </a:r>
-            <a:r>
-              <a:rPr lang="pt-BR" sz="1600" dirty="0" err="1" smtClean="0">
-                <a:latin typeface="Nixie One" panose="020B0604020202020204" charset="0"/>
-              </a:rPr>
-              <a:t>frontend</a:t>
-            </a:r>
-            <a:r>
-              <a:rPr lang="pt-BR" sz="1600" dirty="0" smtClean="0">
-                <a:latin typeface="Nixie One" panose="020B0604020202020204" charset="0"/>
-              </a:rPr>
-              <a:t>.</a:t>
             </a:r>
             <a:endParaRPr lang="pt-BR" sz="1600" dirty="0">
               <a:latin typeface="Nixie One" panose="020B0604020202020204" charset="0"/>
@@ -32404,7 +32541,36 @@
               <a:buFont typeface="Wingdings" panose="05000000000000000000" pitchFamily="2" charset="2"/>
               <a:buChar char="Ø"/>
             </a:pPr>
-            <a:endParaRPr dirty="0"/>
+            <a:r>
+              <a:rPr lang="pt-BR" sz="1600" dirty="0">
+                <a:latin typeface="Nixie One" panose="020B0604020202020204" charset="0"/>
+              </a:rPr>
+              <a:t>Ambientes de </a:t>
+            </a:r>
+            <a:r>
+              <a:rPr lang="pt-BR" sz="1600" dirty="0" smtClean="0">
+                <a:latin typeface="Nixie One" panose="020B0604020202020204" charset="0"/>
+              </a:rPr>
+              <a:t>testes;</a:t>
+            </a:r>
+          </a:p>
+          <a:p>
+            <a:pPr marL="285750" lvl="0" indent="-285750" algn="l" rtl="0">
+              <a:spcBef>
+                <a:spcPts val="600"/>
+              </a:spcBef>
+              <a:spcAft>
+                <a:spcPts val="0"/>
+              </a:spcAft>
+              <a:buFont typeface="Wingdings" panose="05000000000000000000" pitchFamily="2" charset="2"/>
+              <a:buChar char="Ø"/>
+            </a:pPr>
+            <a:r>
+              <a:rPr lang="pt-BR" sz="1600" dirty="0" smtClean="0">
+                <a:latin typeface="Nixie One" panose="020B0604020202020204" charset="0"/>
+              </a:rPr>
+              <a:t>Compatibilidade desktop e mobile.</a:t>
+            </a:r>
           </a:p>
         </p:txBody>
       </p:sp>

</xml_diff>